<commit_message>
Mojaloop - MOSIP deck
</commit_message>
<xml_diff>
--- a/presentations/pi_23_oct_2023/presentations/Mojaloop-MOSIP-G2P-PI23.pptx
+++ b/presentations/pi_23_oct_2023/presentations/Mojaloop-MOSIP-G2P-PI23.pptx
@@ -15,16 +15,17 @@
     <p:sldId id="258" r:id="rId9"/>
     <p:sldId id="259" r:id="rId10"/>
     <p:sldId id="260" r:id="rId11"/>
+    <p:sldId id="261" r:id="rId12"/>
   </p:sldIdLst>
   <p:sldSz cy="13716000" cx="24387175"/>
   <p:notesSz cx="6858000" cy="9144000"/>
   <p:embeddedFontLst>
     <p:embeddedFont>
       <p:font typeface="Nunito"/>
-      <p:regular r:id="rId12"/>
-      <p:bold r:id="rId13"/>
-      <p:italic r:id="rId14"/>
-      <p:boldItalic r:id="rId15"/>
+      <p:regular r:id="rId13"/>
+      <p:bold r:id="rId14"/>
+      <p:italic r:id="rId15"/>
+      <p:boldItalic r:id="rId16"/>
     </p:embeddedFont>
   </p:embeddedFontLst>
   <p:defaultTextStyle>
@@ -258,7 +259,7 @@
   </p:defaultTextStyle>
   <p:extLst>
     <p:ext uri="GoogleSlidesCustomDataVersion2">
-      <go:slidesCustomData xmlns:go="http://customooxmlschemas.google.com/" r:id="rId16" roundtripDataSignature="AMtx7mgj1ui9UN9XwaIwT8/SXpYhXZTr3w=="/>
+      <go:slidesCustomData xmlns:go="http://customooxmlschemas.google.com/" r:id="rId17" roundtripDataSignature="AMtx7mji4bfd5WmXsC9MmFs9dNxWmmP8pA=="/>
     </p:ext>
   </p:extLst>
 </p:presentation>
@@ -1931,7 +1932,7 @@
   <p:cSld>
     <p:spTree>
       <p:nvGrpSpPr>
-        <p:cNvPr id="357" name="Shape 357"/>
+        <p:cNvPr id="356" name="Shape 356"/>
         <p:cNvGrpSpPr/>
         <p:nvPr/>
       </p:nvGrpSpPr>
@@ -1945,7 +1946,7 @@
       </p:grpSpPr>
       <p:sp>
         <p:nvSpPr>
-          <p:cNvPr id="358" name="Google Shape;358;g2485fe39a8f_0_151:notes"/>
+          <p:cNvPr id="357" name="Google Shape;357;g295acca2e21_0_208:notes"/>
           <p:cNvSpPr txBox="1"/>
           <p:nvPr>
             <p:ph idx="1" type="body"/>
@@ -1992,7 +1993,7 @@
       </p:sp>
       <p:sp>
         <p:nvSpPr>
-          <p:cNvPr id="359" name="Google Shape;359;g2485fe39a8f_0_151:notes"/>
+          <p:cNvPr id="358" name="Google Shape;358;g295acca2e21_0_208:notes"/>
           <p:cNvSpPr/>
           <p:nvPr>
             <p:ph idx="2" type="sldImg"/>
@@ -2062,7 +2063,124 @@
       </p:grpSpPr>
       <p:sp>
         <p:nvSpPr>
-          <p:cNvPr id="365" name="Google Shape;365;g249af55d0f0_3_0:notes"/>
+          <p:cNvPr id="365" name="Google Shape;365;g2485fe39a8f_0_151:notes"/>
+          <p:cNvSpPr txBox="1"/>
+          <p:nvPr>
+            <p:ph idx="1" type="body"/>
+          </p:nvPr>
+        </p:nvSpPr>
+        <p:spPr>
+          <a:xfrm>
+            <a:off x="685800" y="4400550"/>
+            <a:ext cx="5486400" cy="3600600"/>
+          </a:xfrm>
+          <a:prstGeom prst="rect">
+            <a:avLst/>
+          </a:prstGeom>
+          <a:noFill/>
+          <a:ln>
+            <a:noFill/>
+          </a:ln>
+        </p:spPr>
+        <p:txBody>
+          <a:bodyPr anchorCtr="0" anchor="t" bIns="45700" lIns="91425" spcFirstLastPara="1" rIns="91425" wrap="square" tIns="45700">
+            <a:noAutofit/>
+          </a:bodyPr>
+          <a:lstStyle/>
+          <a:p>
+            <a:pPr indent="0" lvl="0" marL="0" rtl="0" algn="l">
+              <a:lnSpc>
+                <a:spcPct val="100000"/>
+              </a:lnSpc>
+              <a:spcBef>
+                <a:spcPts val="0"/>
+              </a:spcBef>
+              <a:spcAft>
+                <a:spcPts val="0"/>
+              </a:spcAft>
+              <a:buSzPts val="1400"/>
+              <a:buNone/>
+            </a:pPr>
+            <a:r>
+              <a:t/>
+            </a:r>
+            <a:endParaRPr/>
+          </a:p>
+        </p:txBody>
+      </p:sp>
+      <p:sp>
+        <p:nvSpPr>
+          <p:cNvPr id="366" name="Google Shape;366;g2485fe39a8f_0_151:notes"/>
+          <p:cNvSpPr/>
+          <p:nvPr>
+            <p:ph idx="2" type="sldImg"/>
+          </p:nvPr>
+        </p:nvSpPr>
+        <p:spPr>
+          <a:xfrm>
+            <a:off x="685800" y="1143000"/>
+            <a:ext cx="5486400" cy="3086100"/>
+          </a:xfrm>
+          <a:custGeom>
+            <a:rect b="b" l="l" r="r" t="t"/>
+            <a:pathLst>
+              <a:path extrusionOk="0" h="120000" w="120000">
+                <a:moveTo>
+                  <a:pt x="0" y="0"/>
+                </a:moveTo>
+                <a:lnTo>
+                  <a:pt x="120000" y="0"/>
+                </a:lnTo>
+                <a:lnTo>
+                  <a:pt x="120000" y="120000"/>
+                </a:lnTo>
+                <a:lnTo>
+                  <a:pt x="0" y="120000"/>
+                </a:lnTo>
+                <a:close/>
+              </a:path>
+            </a:pathLst>
+          </a:custGeom>
+          <a:noFill/>
+          <a:ln cap="flat" cmpd="sng" w="12700">
+            <a:solidFill>
+              <a:srgbClr val="000000"/>
+            </a:solidFill>
+            <a:prstDash val="solid"/>
+            <a:round/>
+            <a:headEnd len="sm" w="sm" type="none"/>
+            <a:tailEnd len="sm" w="sm" type="none"/>
+          </a:ln>
+        </p:spPr>
+      </p:sp>
+    </p:spTree>
+  </p:cSld>
+  <p:clrMapOvr>
+    <a:masterClrMapping/>
+  </p:clrMapOvr>
+</p:notes>
+</file>
+
+<file path=ppt/notesSlides/notesSlide5.xml><?xml version="1.0" encoding="utf-8"?>
+<p:notes xmlns:a="http://schemas.openxmlformats.org/drawingml/2006/main" xmlns:r="http://schemas.openxmlformats.org/officeDocument/2006/relationships" xmlns:mc="http://schemas.openxmlformats.org/markup-compatibility/2006" xmlns:mv="urn:schemas-microsoft-com:mac:vml" xmlns:p="http://schemas.openxmlformats.org/presentationml/2006/main" xmlns:c="http://schemas.openxmlformats.org/drawingml/2006/chart" xmlns:dgm="http://schemas.openxmlformats.org/drawingml/2006/diagram" xmlns:o="urn:schemas-microsoft-com:office:office" xmlns:v="urn:schemas-microsoft-com:vml" xmlns:pvml="urn:schemas-microsoft-com:office:powerpoint" xmlns:com="http://schemas.openxmlformats.org/drawingml/2006/compatibility" xmlns:p14="http://schemas.microsoft.com/office/powerpoint/2010/main" xmlns:p15="http://schemas.microsoft.com/office/powerpoint/2012/main" xmlns:ahyp="http://schemas.microsoft.com/office/drawing/2018/hyperlinkcolor" showMasterPhAnim="0" showMasterSp="0">
+  <p:cSld>
+    <p:spTree>
+      <p:nvGrpSpPr>
+        <p:cNvPr id="371" name="Shape 371"/>
+        <p:cNvGrpSpPr/>
+        <p:nvPr/>
+      </p:nvGrpSpPr>
+      <p:grpSpPr>
+        <a:xfrm>
+          <a:off x="0" y="0"/>
+          <a:ext cx="0" cy="0"/>
+          <a:chOff x="0" y="0"/>
+          <a:chExt cx="0" cy="0"/>
+        </a:xfrm>
+      </p:grpSpPr>
+      <p:sp>
+        <p:nvSpPr>
+          <p:cNvPr id="372" name="Google Shape;372;g249af55d0f0_3_0:notes"/>
           <p:cNvSpPr/>
           <p:nvPr>
             <p:ph idx="2" type="sldImg"/>
@@ -2107,7 +2225,7 @@
       </p:sp>
       <p:sp>
         <p:nvSpPr>
-          <p:cNvPr id="366" name="Google Shape;366;g249af55d0f0_3_0:notes"/>
+          <p:cNvPr id="373" name="Google Shape;373;g249af55d0f0_3_0:notes"/>
           <p:cNvSpPr txBox="1"/>
           <p:nvPr>
             <p:ph idx="1" type="body"/>
@@ -2154,7 +2272,7 @@
       </p:sp>
       <p:sp>
         <p:nvSpPr>
-          <p:cNvPr id="367" name="Google Shape;367;g249af55d0f0_3_0:notes"/>
+          <p:cNvPr id="374" name="Google Shape;374;g249af55d0f0_3_0:notes"/>
           <p:cNvSpPr txBox="1"/>
           <p:nvPr>
             <p:ph idx="12" type="sldNum"/>
@@ -2212,12 +2330,12 @@
 </p:notes>
 </file>
 
-<file path=ppt/notesSlides/notesSlide5.xml><?xml version="1.0" encoding="utf-8"?>
+<file path=ppt/notesSlides/notesSlide6.xml><?xml version="1.0" encoding="utf-8"?>
 <p:notes xmlns:a="http://schemas.openxmlformats.org/drawingml/2006/main" xmlns:r="http://schemas.openxmlformats.org/officeDocument/2006/relationships" xmlns:mc="http://schemas.openxmlformats.org/markup-compatibility/2006" xmlns:mv="urn:schemas-microsoft-com:mac:vml" xmlns:p="http://schemas.openxmlformats.org/presentationml/2006/main" xmlns:c="http://schemas.openxmlformats.org/drawingml/2006/chart" xmlns:dgm="http://schemas.openxmlformats.org/drawingml/2006/diagram" xmlns:o="urn:schemas-microsoft-com:office:office" xmlns:v="urn:schemas-microsoft-com:vml" xmlns:pvml="urn:schemas-microsoft-com:office:powerpoint" xmlns:com="http://schemas.openxmlformats.org/drawingml/2006/compatibility" xmlns:p14="http://schemas.microsoft.com/office/powerpoint/2010/main" xmlns:p15="http://schemas.microsoft.com/office/powerpoint/2012/main" xmlns:ahyp="http://schemas.microsoft.com/office/drawing/2018/hyperlinkcolor" showMasterPhAnim="0" showMasterSp="0">
   <p:cSld>
     <p:spTree>
       <p:nvGrpSpPr>
-        <p:cNvPr id="372" name="Shape 372"/>
+        <p:cNvPr id="379" name="Shape 379"/>
         <p:cNvGrpSpPr/>
         <p:nvPr/>
       </p:nvGrpSpPr>
@@ -2231,7 +2349,7 @@
       </p:grpSpPr>
       <p:sp>
         <p:nvSpPr>
-          <p:cNvPr id="373" name="Google Shape;373;g295acca2e21_2_8:notes"/>
+          <p:cNvPr id="380" name="Google Shape;380;g295acca2e21_2_8:notes"/>
           <p:cNvSpPr/>
           <p:nvPr>
             <p:ph idx="2" type="sldImg"/>
@@ -2266,7 +2384,7 @@
       </p:sp>
       <p:sp>
         <p:nvSpPr>
-          <p:cNvPr id="374" name="Google Shape;374;g295acca2e21_2_8:notes"/>
+          <p:cNvPr id="381" name="Google Shape;381;g295acca2e21_2_8:notes"/>
           <p:cNvSpPr txBox="1"/>
           <p:nvPr>
             <p:ph idx="1" type="body"/>
@@ -2305,7 +2423,7 @@
       </p:sp>
       <p:sp>
         <p:nvSpPr>
-          <p:cNvPr id="375" name="Google Shape;375;g295acca2e21_2_8:notes"/>
+          <p:cNvPr id="382" name="Google Shape;382;g295acca2e21_2_8:notes"/>
           <p:cNvSpPr txBox="1"/>
           <p:nvPr>
             <p:ph idx="12" type="sldNum"/>
@@ -49332,8 +49450,8 @@
         </p:nvSpPr>
         <p:spPr>
           <a:xfrm>
-            <a:off x="1676619" y="730251"/>
-            <a:ext cx="18869400" cy="2651100"/>
+            <a:off x="1676625" y="730250"/>
+            <a:ext cx="18869400" cy="1727100"/>
           </a:xfrm>
           <a:prstGeom prst="rect">
             <a:avLst/>
@@ -49365,7 +49483,7 @@
             </a:pPr>
             <a:r>
               <a:rPr lang="en-US" sz="6000"/>
-              <a:t>PI23 Status</a:t>
+              <a:t>PoC Goals</a:t>
             </a:r>
             <a:endParaRPr sz="6000"/>
           </a:p>
@@ -49429,6 +49547,310 @@
         <p:spPr>
           <a:xfrm>
             <a:off x="1676625" y="2868625"/>
+            <a:ext cx="20409300" cy="5171700"/>
+          </a:xfrm>
+          <a:prstGeom prst="rect">
+            <a:avLst/>
+          </a:prstGeom>
+          <a:noFill/>
+          <a:ln>
+            <a:noFill/>
+          </a:ln>
+        </p:spPr>
+        <p:txBody>
+          <a:bodyPr anchorCtr="0" anchor="t" bIns="91425" lIns="91425" spcFirstLastPara="1" rIns="91425" wrap="square" tIns="91425">
+            <a:spAutoFit/>
+          </a:bodyPr>
+          <a:lstStyle/>
+          <a:p>
+            <a:pPr indent="-533400" lvl="0" marL="914400" marR="0" rtl="0" algn="l">
+              <a:lnSpc>
+                <a:spcPct val="115000"/>
+              </a:lnSpc>
+              <a:spcBef>
+                <a:spcPts val="0"/>
+              </a:spcBef>
+              <a:spcAft>
+                <a:spcPts val="0"/>
+              </a:spcAft>
+              <a:buClr>
+                <a:schemeClr val="dk1"/>
+              </a:buClr>
+              <a:buSzPts val="4800"/>
+              <a:buFont typeface="Arial"/>
+              <a:buAutoNum type="arabicPeriod"/>
+            </a:pPr>
+            <a:r>
+              <a:rPr lang="en-US" sz="4800">
+                <a:solidFill>
+                  <a:schemeClr val="dk1"/>
+                </a:solidFill>
+              </a:rPr>
+              <a:t>Understand capabilities of the adjacent platform(s) better: MOSIP, Mifos</a:t>
+            </a:r>
+            <a:endParaRPr b="0" i="0" sz="4800" u="none" cap="none" strike="noStrike">
+              <a:solidFill>
+                <a:schemeClr val="dk1"/>
+              </a:solidFill>
+              <a:latin typeface="Arial"/>
+              <a:ea typeface="Arial"/>
+              <a:cs typeface="Arial"/>
+              <a:sym typeface="Arial"/>
+            </a:endParaRPr>
+          </a:p>
+          <a:p>
+            <a:pPr indent="-533400" lvl="0" marL="914400" marR="0" rtl="0" algn="l">
+              <a:lnSpc>
+                <a:spcPct val="115000"/>
+              </a:lnSpc>
+              <a:spcBef>
+                <a:spcPts val="0"/>
+              </a:spcBef>
+              <a:spcAft>
+                <a:spcPts val="0"/>
+              </a:spcAft>
+              <a:buClr>
+                <a:schemeClr val="dk1"/>
+              </a:buClr>
+              <a:buSzPts val="4800"/>
+              <a:buAutoNum type="arabicPeriod"/>
+            </a:pPr>
+            <a:r>
+              <a:rPr lang="en-US" sz="4800">
+                <a:solidFill>
+                  <a:schemeClr val="dk1"/>
+                </a:solidFill>
+              </a:rPr>
+              <a:t>Enable integration to provide guidance, template</a:t>
+            </a:r>
+            <a:endParaRPr sz="4800">
+              <a:solidFill>
+                <a:schemeClr val="dk1"/>
+              </a:solidFill>
+            </a:endParaRPr>
+          </a:p>
+          <a:p>
+            <a:pPr indent="-533400" lvl="0" marL="914400" marR="0" rtl="0" algn="l">
+              <a:lnSpc>
+                <a:spcPct val="115000"/>
+              </a:lnSpc>
+              <a:spcBef>
+                <a:spcPts val="0"/>
+              </a:spcBef>
+              <a:spcAft>
+                <a:spcPts val="0"/>
+              </a:spcAft>
+              <a:buClr>
+                <a:schemeClr val="dk1"/>
+              </a:buClr>
+              <a:buSzPts val="4800"/>
+              <a:buAutoNum type="arabicPeriod"/>
+            </a:pPr>
+            <a:r>
+              <a:rPr lang="en-US" sz="4800">
+                <a:solidFill>
+                  <a:schemeClr val="dk1"/>
+                </a:solidFill>
+              </a:rPr>
+              <a:t>Setup a foundation that can be built on for better quality deliverables</a:t>
+            </a:r>
+            <a:endParaRPr sz="4800">
+              <a:solidFill>
+                <a:schemeClr val="dk1"/>
+              </a:solidFill>
+            </a:endParaRPr>
+          </a:p>
+          <a:p>
+            <a:pPr indent="-533400" lvl="0" marL="914400" marR="0" rtl="0" algn="l">
+              <a:lnSpc>
+                <a:spcPct val="115000"/>
+              </a:lnSpc>
+              <a:spcBef>
+                <a:spcPts val="0"/>
+              </a:spcBef>
+              <a:spcAft>
+                <a:spcPts val="0"/>
+              </a:spcAft>
+              <a:buClr>
+                <a:schemeClr val="dk1"/>
+              </a:buClr>
+              <a:buSzPts val="4800"/>
+              <a:buFont typeface="Arial"/>
+              <a:buAutoNum type="arabicPeriod"/>
+            </a:pPr>
+            <a:r>
+              <a:rPr lang="en-US" sz="4800">
+                <a:solidFill>
+                  <a:schemeClr val="dk1"/>
+                </a:solidFill>
+              </a:rPr>
+              <a:t>Enhance collaboration between DPGs</a:t>
+            </a:r>
+            <a:endParaRPr b="0" i="0" sz="4800" u="none" cap="none" strike="noStrike">
+              <a:solidFill>
+                <a:schemeClr val="dk1"/>
+              </a:solidFill>
+              <a:latin typeface="Arial"/>
+              <a:ea typeface="Arial"/>
+              <a:cs typeface="Arial"/>
+              <a:sym typeface="Arial"/>
+            </a:endParaRPr>
+          </a:p>
+          <a:p>
+            <a:pPr indent="0" lvl="0" marL="0" marR="0" rtl="0" algn="l">
+              <a:lnSpc>
+                <a:spcPct val="115000"/>
+              </a:lnSpc>
+              <a:spcBef>
+                <a:spcPts val="0"/>
+              </a:spcBef>
+              <a:spcAft>
+                <a:spcPts val="0"/>
+              </a:spcAft>
+              <a:buNone/>
+            </a:pPr>
+            <a:r>
+              <a:t/>
+            </a:r>
+            <a:endParaRPr b="0" i="0" sz="4800" u="none" cap="none" strike="noStrike">
+              <a:solidFill>
+                <a:schemeClr val="dk1"/>
+              </a:solidFill>
+              <a:latin typeface="Arial"/>
+              <a:ea typeface="Arial"/>
+              <a:cs typeface="Arial"/>
+              <a:sym typeface="Arial"/>
+            </a:endParaRPr>
+          </a:p>
+        </p:txBody>
+      </p:sp>
+    </p:spTree>
+  </p:cSld>
+  <p:clrMapOvr>
+    <a:masterClrMapping/>
+  </p:clrMapOvr>
+</p:sld>
+</file>
+
+<file path=ppt/slides/slide3.xml><?xml version="1.0" encoding="utf-8"?>
+<p:sld xmlns:a="http://schemas.openxmlformats.org/drawingml/2006/main" xmlns:r="http://schemas.openxmlformats.org/officeDocument/2006/relationships" xmlns:mc="http://schemas.openxmlformats.org/markup-compatibility/2006" xmlns:mv="urn:schemas-microsoft-com:mac:vml" xmlns:p="http://schemas.openxmlformats.org/presentationml/2006/main" xmlns:c="http://schemas.openxmlformats.org/drawingml/2006/chart" xmlns:dgm="http://schemas.openxmlformats.org/drawingml/2006/diagram" xmlns:o="urn:schemas-microsoft-com:office:office" xmlns:v="urn:schemas-microsoft-com:vml" xmlns:pvml="urn:schemas-microsoft-com:office:powerpoint" xmlns:com="http://schemas.openxmlformats.org/drawingml/2006/compatibility" xmlns:p14="http://schemas.microsoft.com/office/powerpoint/2010/main" xmlns:p15="http://schemas.microsoft.com/office/powerpoint/2012/main" xmlns:ahyp="http://schemas.microsoft.com/office/drawing/2018/hyperlinkcolor">
+  <p:cSld>
+    <p:spTree>
+      <p:nvGrpSpPr>
+        <p:cNvPr id="359" name="Shape 359"/>
+        <p:cNvGrpSpPr/>
+        <p:nvPr/>
+      </p:nvGrpSpPr>
+      <p:grpSpPr>
+        <a:xfrm>
+          <a:off x="0" y="0"/>
+          <a:ext cx="0" cy="0"/>
+          <a:chOff x="0" y="0"/>
+          <a:chExt cx="0" cy="0"/>
+        </a:xfrm>
+      </p:grpSpPr>
+      <p:sp>
+        <p:nvSpPr>
+          <p:cNvPr id="360" name="Google Shape;360;g295acca2e21_0_208"/>
+          <p:cNvSpPr txBox="1"/>
+          <p:nvPr>
+            <p:ph type="title"/>
+          </p:nvPr>
+        </p:nvSpPr>
+        <p:spPr>
+          <a:xfrm>
+            <a:off x="1676619" y="730251"/>
+            <a:ext cx="18869400" cy="2651100"/>
+          </a:xfrm>
+          <a:prstGeom prst="rect">
+            <a:avLst/>
+          </a:prstGeom>
+          <a:noFill/>
+          <a:ln>
+            <a:noFill/>
+          </a:ln>
+        </p:spPr>
+        <p:txBody>
+          <a:bodyPr anchorCtr="0" anchor="ctr" bIns="45700" lIns="91425" spcFirstLastPara="1" rIns="91425" wrap="square" tIns="45700">
+            <a:normAutofit/>
+          </a:bodyPr>
+          <a:lstStyle/>
+          <a:p>
+            <a:pPr indent="0" lvl="0" marL="0" rtl="0" algn="l">
+              <a:spcBef>
+                <a:spcPts val="0"/>
+              </a:spcBef>
+              <a:spcAft>
+                <a:spcPts val="0"/>
+              </a:spcAft>
+              <a:buClr>
+                <a:schemeClr val="dk1"/>
+              </a:buClr>
+              <a:buSzPts val="1100"/>
+              <a:buFont typeface="Arial"/>
+              <a:buNone/>
+            </a:pPr>
+            <a:r>
+              <a:rPr lang="en-US" sz="6000"/>
+              <a:t>PI23 Status</a:t>
+            </a:r>
+            <a:endParaRPr sz="6000"/>
+          </a:p>
+        </p:txBody>
+      </p:sp>
+      <p:sp>
+        <p:nvSpPr>
+          <p:cNvPr id="361" name="Google Shape;361;g295acca2e21_0_208"/>
+          <p:cNvSpPr txBox="1"/>
+          <p:nvPr>
+            <p:ph idx="12" type="sldNum"/>
+          </p:nvPr>
+        </p:nvSpPr>
+        <p:spPr>
+          <a:xfrm>
+            <a:off x="17223443" y="12712701"/>
+            <a:ext cx="5487000" cy="730200"/>
+          </a:xfrm>
+          <a:prstGeom prst="rect">
+            <a:avLst/>
+          </a:prstGeom>
+          <a:noFill/>
+          <a:ln>
+            <a:noFill/>
+          </a:ln>
+        </p:spPr>
+        <p:txBody>
+          <a:bodyPr anchorCtr="0" anchor="ctr" bIns="45700" lIns="91425" spcFirstLastPara="1" rIns="91425" wrap="square" tIns="45700">
+            <a:noAutofit/>
+          </a:bodyPr>
+          <a:lstStyle/>
+          <a:p>
+            <a:pPr indent="0" lvl="0" marL="0" rtl="0" algn="r">
+              <a:spcBef>
+                <a:spcPts val="0"/>
+              </a:spcBef>
+              <a:spcAft>
+                <a:spcPts val="0"/>
+              </a:spcAft>
+              <a:buNone/>
+            </a:pPr>
+            <a:fld id="{00000000-1234-1234-1234-123412341234}" type="slidenum">
+              <a:rPr lang="en-US"/>
+              <a:t>‹#›</a:t>
+            </a:fld>
+            <a:endParaRPr/>
+          </a:p>
+        </p:txBody>
+      </p:sp>
+      <p:sp>
+        <p:nvSpPr>
+          <p:cNvPr id="362" name="Google Shape;362;g295acca2e21_0_208"/>
+          <p:cNvSpPr txBox="1"/>
+          <p:nvPr/>
+        </p:nvSpPr>
+        <p:spPr>
+          <a:xfrm>
+            <a:off x="1676625" y="2868625"/>
             <a:ext cx="20409300" cy="3407700"/>
           </a:xfrm>
           <a:prstGeom prst="rect">
@@ -49678,7 +50100,7 @@
       </p:sp>
       <p:sp>
         <p:nvSpPr>
-          <p:cNvPr id="356" name="Google Shape;356;g295acca2e21_0_111"/>
+          <p:cNvPr id="363" name="Google Shape;363;g295acca2e21_0_208"/>
           <p:cNvSpPr txBox="1"/>
           <p:nvPr>
             <p:ph idx="1" type="body"/>
@@ -49800,12 +50222,12 @@
 </p:sld>
 </file>
 
-<file path=ppt/slides/slide3.xml><?xml version="1.0" encoding="utf-8"?>
+<file path=ppt/slides/slide4.xml><?xml version="1.0" encoding="utf-8"?>
 <p:sld xmlns:a="http://schemas.openxmlformats.org/drawingml/2006/main" xmlns:r="http://schemas.openxmlformats.org/officeDocument/2006/relationships" xmlns:mc="http://schemas.openxmlformats.org/markup-compatibility/2006" xmlns:mv="urn:schemas-microsoft-com:mac:vml" xmlns:p="http://schemas.openxmlformats.org/presentationml/2006/main" xmlns:c="http://schemas.openxmlformats.org/drawingml/2006/chart" xmlns:dgm="http://schemas.openxmlformats.org/drawingml/2006/diagram" xmlns:o="urn:schemas-microsoft-com:office:office" xmlns:v="urn:schemas-microsoft-com:vml" xmlns:pvml="urn:schemas-microsoft-com:office:powerpoint" xmlns:com="http://schemas.openxmlformats.org/drawingml/2006/compatibility" xmlns:p14="http://schemas.microsoft.com/office/powerpoint/2010/main" xmlns:p15="http://schemas.microsoft.com/office/powerpoint/2012/main" xmlns:ahyp="http://schemas.microsoft.com/office/drawing/2018/hyperlinkcolor">
   <p:cSld>
     <p:spTree>
       <p:nvGrpSpPr>
-        <p:cNvPr id="360" name="Shape 360"/>
+        <p:cNvPr id="367" name="Shape 367"/>
         <p:cNvGrpSpPr/>
         <p:nvPr/>
       </p:nvGrpSpPr>
@@ -49819,7 +50241,7 @@
       </p:grpSpPr>
       <p:sp>
         <p:nvSpPr>
-          <p:cNvPr id="361" name="Google Shape;361;g2485fe39a8f_0_151"/>
+          <p:cNvPr id="368" name="Google Shape;368;g2485fe39a8f_0_151"/>
           <p:cNvSpPr txBox="1"/>
           <p:nvPr>
             <p:ph type="title"/>
@@ -49875,7 +50297,7 @@
       </p:sp>
       <p:sp>
         <p:nvSpPr>
-          <p:cNvPr id="362" name="Google Shape;362;g2485fe39a8f_0_151"/>
+          <p:cNvPr id="369" name="Google Shape;369;g2485fe39a8f_0_151"/>
           <p:cNvSpPr txBox="1"/>
           <p:nvPr>
             <p:ph idx="12" type="sldNum"/>
@@ -49923,7 +50345,7 @@
       </p:sp>
       <p:pic>
         <p:nvPicPr>
-          <p:cNvPr id="363" name="Google Shape;363;g2485fe39a8f_0_151"/>
+          <p:cNvPr id="370" name="Google Shape;370;g2485fe39a8f_0_151"/>
           <p:cNvPicPr preferRelativeResize="0"/>
           <p:nvPr/>
         </p:nvPicPr>
@@ -49956,12 +50378,12 @@
 </p:sld>
 </file>
 
-<file path=ppt/slides/slide4.xml><?xml version="1.0" encoding="utf-8"?>
+<file path=ppt/slides/slide5.xml><?xml version="1.0" encoding="utf-8"?>
 <p:sld xmlns:a="http://schemas.openxmlformats.org/drawingml/2006/main" xmlns:r="http://schemas.openxmlformats.org/officeDocument/2006/relationships" xmlns:mc="http://schemas.openxmlformats.org/markup-compatibility/2006" xmlns:mv="urn:schemas-microsoft-com:mac:vml" xmlns:p="http://schemas.openxmlformats.org/presentationml/2006/main" xmlns:c="http://schemas.openxmlformats.org/drawingml/2006/chart" xmlns:dgm="http://schemas.openxmlformats.org/drawingml/2006/diagram" xmlns:o="urn:schemas-microsoft-com:office:office" xmlns:v="urn:schemas-microsoft-com:vml" xmlns:pvml="urn:schemas-microsoft-com:office:powerpoint" xmlns:com="http://schemas.openxmlformats.org/drawingml/2006/compatibility" xmlns:p14="http://schemas.microsoft.com/office/powerpoint/2010/main" xmlns:p15="http://schemas.microsoft.com/office/powerpoint/2012/main" xmlns:ahyp="http://schemas.microsoft.com/office/drawing/2018/hyperlinkcolor">
   <p:cSld>
     <p:spTree>
       <p:nvGrpSpPr>
-        <p:cNvPr id="368" name="Shape 368"/>
+        <p:cNvPr id="375" name="Shape 375"/>
         <p:cNvGrpSpPr/>
         <p:nvPr/>
       </p:nvGrpSpPr>
@@ -49975,7 +50397,7 @@
       </p:grpSpPr>
       <p:sp>
         <p:nvSpPr>
-          <p:cNvPr id="369" name="Google Shape;369;g249af55d0f0_3_0"/>
+          <p:cNvPr id="376" name="Google Shape;376;g249af55d0f0_3_0"/>
           <p:cNvSpPr txBox="1"/>
           <p:nvPr>
             <p:ph type="title"/>
@@ -50031,7 +50453,7 @@
       </p:sp>
       <p:sp>
         <p:nvSpPr>
-          <p:cNvPr id="370" name="Google Shape;370;g249af55d0f0_3_0"/>
+          <p:cNvPr id="377" name="Google Shape;377;g249af55d0f0_3_0"/>
           <p:cNvSpPr txBox="1"/>
           <p:nvPr>
             <p:ph idx="12" type="sldNum"/>
@@ -50083,7 +50505,7 @@
       </p:sp>
       <p:pic>
         <p:nvPicPr>
-          <p:cNvPr id="371" name="Google Shape;371;g249af55d0f0_3_0"/>
+          <p:cNvPr id="378" name="Google Shape;378;g249af55d0f0_3_0"/>
           <p:cNvPicPr preferRelativeResize="0"/>
           <p:nvPr/>
         </p:nvPicPr>
@@ -50116,12 +50538,12 @@
 </p:sld>
 </file>
 
-<file path=ppt/slides/slide5.xml><?xml version="1.0" encoding="utf-8"?>
+<file path=ppt/slides/slide6.xml><?xml version="1.0" encoding="utf-8"?>
 <p:sld xmlns:a="http://schemas.openxmlformats.org/drawingml/2006/main" xmlns:r="http://schemas.openxmlformats.org/officeDocument/2006/relationships" xmlns:mc="http://schemas.openxmlformats.org/markup-compatibility/2006" xmlns:mv="urn:schemas-microsoft-com:mac:vml" xmlns:p="http://schemas.openxmlformats.org/presentationml/2006/main" xmlns:c="http://schemas.openxmlformats.org/drawingml/2006/chart" xmlns:dgm="http://schemas.openxmlformats.org/drawingml/2006/diagram" xmlns:o="urn:schemas-microsoft-com:office:office" xmlns:v="urn:schemas-microsoft-com:vml" xmlns:pvml="urn:schemas-microsoft-com:office:powerpoint" xmlns:com="http://schemas.openxmlformats.org/drawingml/2006/compatibility" xmlns:p14="http://schemas.microsoft.com/office/powerpoint/2010/main" xmlns:p15="http://schemas.microsoft.com/office/powerpoint/2012/main" xmlns:ahyp="http://schemas.microsoft.com/office/drawing/2018/hyperlinkcolor">
   <p:cSld>
     <p:spTree>
       <p:nvGrpSpPr>
-        <p:cNvPr id="376" name="Shape 376"/>
+        <p:cNvPr id="383" name="Shape 383"/>
         <p:cNvGrpSpPr/>
         <p:nvPr/>
       </p:nvGrpSpPr>
@@ -50135,7 +50557,7 @@
       </p:grpSpPr>
       <p:sp>
         <p:nvSpPr>
-          <p:cNvPr id="377" name="Google Shape;377;g295acca2e21_2_8"/>
+          <p:cNvPr id="384" name="Google Shape;384;g295acca2e21_2_8"/>
           <p:cNvSpPr txBox="1"/>
           <p:nvPr>
             <p:ph idx="12" type="sldNum"/>
@@ -50180,7 +50602,7 @@
       </p:sp>
       <p:sp>
         <p:nvSpPr>
-          <p:cNvPr id="378" name="Google Shape;378;g295acca2e21_2_8"/>
+          <p:cNvPr id="385" name="Google Shape;385;g295acca2e21_2_8"/>
           <p:cNvSpPr/>
           <p:nvPr/>
         </p:nvSpPr>
@@ -50234,7 +50656,7 @@
       </p:sp>
       <p:sp>
         <p:nvSpPr>
-          <p:cNvPr id="379" name="Google Shape;379;g295acca2e21_2_8"/>
+          <p:cNvPr id="386" name="Google Shape;386;g295acca2e21_2_8"/>
           <p:cNvSpPr/>
           <p:nvPr/>
         </p:nvSpPr>
@@ -50288,7 +50710,7 @@
       </p:sp>
       <p:sp>
         <p:nvSpPr>
-          <p:cNvPr id="380" name="Google Shape;380;g295acca2e21_2_8"/>
+          <p:cNvPr id="387" name="Google Shape;387;g295acca2e21_2_8"/>
           <p:cNvSpPr/>
           <p:nvPr/>
         </p:nvSpPr>
@@ -50348,7 +50770,7 @@
       </p:sp>
       <p:sp>
         <p:nvSpPr>
-          <p:cNvPr id="381" name="Google Shape;381;g295acca2e21_2_8"/>
+          <p:cNvPr id="388" name="Google Shape;388;g295acca2e21_2_8"/>
           <p:cNvSpPr/>
           <p:nvPr/>
         </p:nvSpPr>
@@ -50408,7 +50830,7 @@
       </p:sp>
       <p:sp>
         <p:nvSpPr>
-          <p:cNvPr id="382" name="Google Shape;382;g295acca2e21_2_8"/>
+          <p:cNvPr id="389" name="Google Shape;389;g295acca2e21_2_8"/>
           <p:cNvSpPr/>
           <p:nvPr/>
         </p:nvSpPr>
@@ -50468,7 +50890,7 @@
       </p:sp>
       <p:pic>
         <p:nvPicPr>
-          <p:cNvPr id="383" name="Google Shape;383;g295acca2e21_2_8"/>
+          <p:cNvPr id="390" name="Google Shape;390;g295acca2e21_2_8"/>
           <p:cNvPicPr preferRelativeResize="0"/>
           <p:nvPr/>
         </p:nvPicPr>
@@ -50496,7 +50918,7 @@
       </p:pic>
       <p:sp>
         <p:nvSpPr>
-          <p:cNvPr id="384" name="Google Shape;384;g295acca2e21_2_8"/>
+          <p:cNvPr id="391" name="Google Shape;391;g295acca2e21_2_8"/>
           <p:cNvSpPr/>
           <p:nvPr/>
         </p:nvSpPr>
@@ -50559,10 +50981,10 @@
       </p:sp>
       <p:cxnSp>
         <p:nvCxnSpPr>
-          <p:cNvPr id="385" name="Google Shape;385;g295acca2e21_2_8"/>
+          <p:cNvPr id="392" name="Google Shape;392;g295acca2e21_2_8"/>
           <p:cNvCxnSpPr>
-            <a:stCxn id="384" idx="3"/>
-            <a:endCxn id="379" idx="1"/>
+            <a:stCxn id="391" idx="3"/>
+            <a:endCxn id="386" idx="1"/>
           </p:cNvCxnSpPr>
           <p:nvPr/>
         </p:nvCxnSpPr>
@@ -50588,7 +51010,7 @@
       </p:cxnSp>
       <p:sp>
         <p:nvSpPr>
-          <p:cNvPr id="386" name="Google Shape;386;g295acca2e21_2_8"/>
+          <p:cNvPr id="393" name="Google Shape;393;g295acca2e21_2_8"/>
           <p:cNvSpPr txBox="1"/>
           <p:nvPr/>
         </p:nvSpPr>
@@ -50630,7 +51052,7 @@
       </p:sp>
       <p:sp>
         <p:nvSpPr>
-          <p:cNvPr id="387" name="Google Shape;387;g295acca2e21_2_8"/>
+          <p:cNvPr id="394" name="Google Shape;394;g295acca2e21_2_8"/>
           <p:cNvSpPr txBox="1"/>
           <p:nvPr/>
         </p:nvSpPr>
@@ -50672,7 +51094,7 @@
       </p:sp>
       <p:sp>
         <p:nvSpPr>
-          <p:cNvPr id="388" name="Google Shape;388;g295acca2e21_2_8"/>
+          <p:cNvPr id="395" name="Google Shape;395;g295acca2e21_2_8"/>
           <p:cNvSpPr txBox="1"/>
           <p:nvPr/>
         </p:nvSpPr>
@@ -50714,10 +51136,10 @@
       </p:sp>
       <p:cxnSp>
         <p:nvCxnSpPr>
-          <p:cNvPr id="389" name="Google Shape;389;g295acca2e21_2_8"/>
+          <p:cNvPr id="396" name="Google Shape;396;g295acca2e21_2_8"/>
           <p:cNvCxnSpPr>
-            <a:stCxn id="379" idx="0"/>
-            <a:endCxn id="381" idx="2"/>
+            <a:stCxn id="386" idx="0"/>
+            <a:endCxn id="388" idx="2"/>
           </p:cNvCxnSpPr>
           <p:nvPr/>
         </p:nvCxnSpPr>
@@ -50743,10 +51165,10 @@
       </p:cxnSp>
       <p:cxnSp>
         <p:nvCxnSpPr>
-          <p:cNvPr id="390" name="Google Shape;390;g295acca2e21_2_8"/>
+          <p:cNvPr id="397" name="Google Shape;397;g295acca2e21_2_8"/>
           <p:cNvCxnSpPr>
-            <a:stCxn id="379" idx="3"/>
-            <a:endCxn id="382" idx="1"/>
+            <a:stCxn id="386" idx="3"/>
+            <a:endCxn id="389" idx="1"/>
           </p:cNvCxnSpPr>
           <p:nvPr/>
         </p:nvCxnSpPr>
@@ -50772,7 +51194,7 @@
       </p:cxnSp>
       <p:sp>
         <p:nvSpPr>
-          <p:cNvPr id="391" name="Google Shape;391;g295acca2e21_2_8"/>
+          <p:cNvPr id="398" name="Google Shape;398;g295acca2e21_2_8"/>
           <p:cNvSpPr txBox="1"/>
           <p:nvPr/>
         </p:nvSpPr>
@@ -50814,7 +51236,7 @@
       </p:sp>
       <p:sp>
         <p:nvSpPr>
-          <p:cNvPr id="392" name="Google Shape;392;g295acca2e21_2_8"/>
+          <p:cNvPr id="399" name="Google Shape;399;g295acca2e21_2_8"/>
           <p:cNvSpPr txBox="1"/>
           <p:nvPr/>
         </p:nvSpPr>
@@ -50856,7 +51278,7 @@
       </p:sp>
       <p:sp>
         <p:nvSpPr>
-          <p:cNvPr id="393" name="Google Shape;393;g295acca2e21_2_8"/>
+          <p:cNvPr id="400" name="Google Shape;400;g295acca2e21_2_8"/>
           <p:cNvSpPr txBox="1"/>
           <p:nvPr/>
         </p:nvSpPr>
@@ -50898,7 +51320,7 @@
       </p:sp>
       <p:cxnSp>
         <p:nvCxnSpPr>
-          <p:cNvPr id="394" name="Google Shape;394;g295acca2e21_2_8"/>
+          <p:cNvPr id="401" name="Google Shape;401;g295acca2e21_2_8"/>
           <p:cNvCxnSpPr/>
           <p:nvPr/>
         </p:nvCxnSpPr>
@@ -50924,9 +51346,9 @@
       </p:cxnSp>
       <p:cxnSp>
         <p:nvCxnSpPr>
-          <p:cNvPr id="395" name="Google Shape;395;g295acca2e21_2_8"/>
+          <p:cNvPr id="402" name="Google Shape;402;g295acca2e21_2_8"/>
           <p:cNvCxnSpPr>
-            <a:endCxn id="378" idx="1"/>
+            <a:endCxn id="385" idx="1"/>
           </p:cNvCxnSpPr>
           <p:nvPr/>
         </p:nvCxnSpPr>
@@ -50952,7 +51374,7 @@
       </p:cxnSp>
       <p:sp>
         <p:nvSpPr>
-          <p:cNvPr id="396" name="Google Shape;396;g295acca2e21_2_8"/>
+          <p:cNvPr id="403" name="Google Shape;403;g295acca2e21_2_8"/>
           <p:cNvSpPr txBox="1"/>
           <p:nvPr/>
         </p:nvSpPr>
@@ -50994,7 +51416,7 @@
       </p:sp>
       <p:cxnSp>
         <p:nvCxnSpPr>
-          <p:cNvPr id="397" name="Google Shape;397;g295acca2e21_2_8"/>
+          <p:cNvPr id="404" name="Google Shape;404;g295acca2e21_2_8"/>
           <p:cNvCxnSpPr/>
           <p:nvPr/>
         </p:nvCxnSpPr>
@@ -51020,7 +51442,7 @@
       </p:cxnSp>
       <p:sp>
         <p:nvSpPr>
-          <p:cNvPr id="398" name="Google Shape;398;g295acca2e21_2_8"/>
+          <p:cNvPr id="405" name="Google Shape;405;g295acca2e21_2_8"/>
           <p:cNvSpPr txBox="1"/>
           <p:nvPr/>
         </p:nvSpPr>
@@ -51082,7 +51504,7 @@
       </p:sp>
       <p:sp>
         <p:nvSpPr>
-          <p:cNvPr id="399" name="Google Shape;399;g295acca2e21_2_8"/>
+          <p:cNvPr id="406" name="Google Shape;406;g295acca2e21_2_8"/>
           <p:cNvSpPr txBox="1"/>
           <p:nvPr/>
         </p:nvSpPr>
@@ -51124,7 +51546,7 @@
       </p:sp>
       <p:sp>
         <p:nvSpPr>
-          <p:cNvPr id="400" name="Google Shape;400;g295acca2e21_2_8"/>
+          <p:cNvPr id="407" name="Google Shape;407;g295acca2e21_2_8"/>
           <p:cNvSpPr txBox="1"/>
           <p:nvPr/>
         </p:nvSpPr>
@@ -51166,10 +51588,10 @@
       </p:sp>
       <p:cxnSp>
         <p:nvCxnSpPr>
-          <p:cNvPr id="401" name="Google Shape;401;g295acca2e21_2_8"/>
+          <p:cNvPr id="408" name="Google Shape;408;g295acca2e21_2_8"/>
           <p:cNvCxnSpPr>
-            <a:stCxn id="383" idx="1"/>
-            <a:endCxn id="384" idx="1"/>
+            <a:stCxn id="390" idx="1"/>
+            <a:endCxn id="391" idx="1"/>
           </p:cNvCxnSpPr>
           <p:nvPr/>
         </p:nvCxnSpPr>
@@ -51195,7 +51617,7 @@
       </p:cxnSp>
       <p:sp>
         <p:nvSpPr>
-          <p:cNvPr id="402" name="Google Shape;402;g295acca2e21_2_8"/>
+          <p:cNvPr id="409" name="Google Shape;409;g295acca2e21_2_8"/>
           <p:cNvSpPr txBox="1"/>
           <p:nvPr/>
         </p:nvSpPr>
@@ -51237,7 +51659,7 @@
       </p:sp>
       <p:sp>
         <p:nvSpPr>
-          <p:cNvPr id="403" name="Google Shape;403;g295acca2e21_2_8"/>
+          <p:cNvPr id="410" name="Google Shape;410;g295acca2e21_2_8"/>
           <p:cNvSpPr txBox="1"/>
           <p:nvPr/>
         </p:nvSpPr>
@@ -51271,7 +51693,7 @@
             </a:pPr>
             <a:r>
               <a:rPr lang="en-US" sz="3500"/>
-              <a:t>5</a:t>
+              <a:t>6</a:t>
             </a:r>
             <a:endParaRPr sz="3500"/>
           </a:p>
@@ -51279,7 +51701,7 @@
       </p:sp>
       <p:sp>
         <p:nvSpPr>
-          <p:cNvPr id="404" name="Google Shape;404;g295acca2e21_2_8"/>
+          <p:cNvPr id="411" name="Google Shape;411;g295acca2e21_2_8"/>
           <p:cNvSpPr txBox="1"/>
           <p:nvPr/>
         </p:nvSpPr>
@@ -51330,7 +51752,7 @@
 <file path=ppt/theme/theme1.xml><?xml version="1.0" encoding="utf-8"?>
 <a:theme xmlns:a="http://schemas.openxmlformats.org/drawingml/2006/main" xmlns:r="http://schemas.openxmlformats.org/officeDocument/2006/relationships" name="Office Theme">
   <a:themeElements>
-    <a:clrScheme name="Office">
+    <a:clrScheme name="Mojaloop">
       <a:dk1>
         <a:srgbClr val="000000"/>
       </a:dk1>
@@ -51344,22 +51766,22 @@
         <a:srgbClr val="E7E6E6"/>
       </a:lt2>
       <a:accent1>
-        <a:srgbClr val="4472C4"/>
+        <a:srgbClr val="00A3FF"/>
       </a:accent1>
       <a:accent2>
-        <a:srgbClr val="ED7D31"/>
+        <a:srgbClr val="FC440F"/>
       </a:accent2>
       <a:accent3>
-        <a:srgbClr val="A5A5A5"/>
+        <a:srgbClr val="0010BE"/>
       </a:accent3>
       <a:accent4>
-        <a:srgbClr val="FFC000"/>
+        <a:srgbClr val="FDE74C"/>
       </a:accent4>
       <a:accent5>
-        <a:srgbClr val="5B9BD5"/>
+        <a:srgbClr val="00DFB1"/>
       </a:accent5>
       <a:accent6>
-        <a:srgbClr val="70AD47"/>
+        <a:srgbClr val="BE0098"/>
       </a:accent6>
       <a:hlink>
         <a:srgbClr val="0563C1"/>
@@ -52167,7 +52589,7 @@
 <file path=ppt/theme/theme4.xml><?xml version="1.0" encoding="utf-8"?>
 <a:theme xmlns:a="http://schemas.openxmlformats.org/drawingml/2006/main" xmlns:r="http://schemas.openxmlformats.org/officeDocument/2006/relationships" name="Office Theme">
   <a:themeElements>
-    <a:clrScheme name="Mojaloop">
+    <a:clrScheme name="Office">
       <a:dk1>
         <a:srgbClr val="000000"/>
       </a:dk1>
@@ -52181,22 +52603,22 @@
         <a:srgbClr val="E7E6E6"/>
       </a:lt2>
       <a:accent1>
-        <a:srgbClr val="00A3FF"/>
+        <a:srgbClr val="4472C4"/>
       </a:accent1>
       <a:accent2>
-        <a:srgbClr val="FC440F"/>
+        <a:srgbClr val="ED7D31"/>
       </a:accent2>
       <a:accent3>
-        <a:srgbClr val="0010BE"/>
+        <a:srgbClr val="A5A5A5"/>
       </a:accent3>
       <a:accent4>
-        <a:srgbClr val="FDE74C"/>
+        <a:srgbClr val="FFC000"/>
       </a:accent4>
       <a:accent5>
-        <a:srgbClr val="00DFB1"/>
+        <a:srgbClr val="5B9BD5"/>
       </a:accent5>
       <a:accent6>
-        <a:srgbClr val="BE0098"/>
+        <a:srgbClr val="70AD47"/>
       </a:accent6>
       <a:hlink>
         <a:srgbClr val="0563C1"/>

</xml_diff>